<commit_message>
speech updated; presentation updated.
</commit_message>
<xml_diff>
--- a/Documentation/coursetion.pptx
+++ b/Documentation/coursetion.pptx
@@ -8,6 +8,7 @@
     <p:sldId id="256" r:id="rId2"/>
     <p:sldId id="257" r:id="rId3"/>
     <p:sldId id="258" r:id="rId4"/>
+    <p:sldId id="259" r:id="rId5"/>
   </p:sldIdLst>
   <p:sldSz cx="9144000" cy="6858000" type="screen4x3"/>
   <p:notesSz cx="6858000" cy="9144000"/>
@@ -114,6 +115,7 @@
             <p14:sldId id="256"/>
             <p14:sldId id="257"/>
             <p14:sldId id="258"/>
+            <p14:sldId id="259"/>
           </p14:sldIdLst>
         </p14:section>
       </p14:sectionLst>
@@ -3227,6 +3229,16 @@
   <p:clrMapOvr>
     <a:masterClrMapping/>
   </p:clrMapOvr>
+  <p:transition spd="slow">
+    <p:push/>
+  </p:transition>
+  <p:timing>
+    <p:tnLst>
+      <p:par>
+        <p:cTn id="1" dur="indefinite" restart="never" nodeType="tmRoot"/>
+      </p:par>
+    </p:tnLst>
+  </p:timing>
 </p:sld>
 </file>
 
@@ -3755,6 +3767,16 @@
   <p:clrMapOvr>
     <a:masterClrMapping/>
   </p:clrMapOvr>
+  <p:transition spd="slow">
+    <p:push/>
+  </p:transition>
+  <p:timing>
+    <p:tnLst>
+      <p:par>
+        <p:cTn id="1" dur="indefinite" restart="never" nodeType="tmRoot"/>
+      </p:par>
+    </p:tnLst>
+  </p:timing>
 </p:sld>
 </file>
 
@@ -3790,29 +3812,542 @@
           <a:bodyPr/>
           <a:lstStyle/>
           <a:p>
+            <a:r>
+              <a:rPr lang="en-US" dirty="0" smtClean="0"/>
+              <a:t>Tools</a:t>
+            </a:r>
             <a:endParaRPr lang="ru-RU" dirty="0"/>
           </a:p>
         </p:txBody>
       </p:sp>
-      <p:sp>
-        <p:nvSpPr>
-          <p:cNvPr id="3" name="Объект 2"/>
-          <p:cNvSpPr>
-            <a:spLocks noGrp="1"/>
-          </p:cNvSpPr>
-          <p:nvPr>
-            <p:ph idx="1"/>
-          </p:nvPr>
-        </p:nvSpPr>
-        <p:spPr/>
-        <p:txBody>
-          <a:bodyPr/>
-          <a:lstStyle/>
-          <a:p>
-            <a:endParaRPr lang="ru-RU"/>
-          </a:p>
-        </p:txBody>
-      </p:sp>
+      <p:grpSp>
+        <p:nvGrpSpPr>
+          <p:cNvPr id="15" name="Группа 14"/>
+          <p:cNvGrpSpPr/>
+          <p:nvPr/>
+        </p:nvGrpSpPr>
+        <p:grpSpPr>
+          <a:xfrm>
+            <a:off x="1333650" y="3942581"/>
+            <a:ext cx="1584176" cy="1008112"/>
+            <a:chOff x="179512" y="1412776"/>
+            <a:chExt cx="1584176" cy="1008112"/>
+          </a:xfrm>
+        </p:grpSpPr>
+        <p:sp>
+          <p:nvSpPr>
+            <p:cNvPr id="14" name="Прямоугольник 13"/>
+            <p:cNvSpPr/>
+            <p:nvPr/>
+          </p:nvSpPr>
+          <p:spPr>
+            <a:xfrm>
+              <a:off x="179512" y="1412776"/>
+              <a:ext cx="1584176" cy="1008112"/>
+            </a:xfrm>
+            <a:prstGeom prst="rect">
+              <a:avLst/>
+            </a:prstGeom>
+            <a:solidFill>
+              <a:schemeClr val="bg1"/>
+            </a:solidFill>
+            <a:ln>
+              <a:solidFill>
+                <a:schemeClr val="tx1">
+                  <a:alpha val="40000"/>
+                </a:schemeClr>
+              </a:solidFill>
+            </a:ln>
+          </p:spPr>
+          <p:style>
+            <a:lnRef idx="2">
+              <a:schemeClr val="accent1">
+                <a:shade val="50000"/>
+              </a:schemeClr>
+            </a:lnRef>
+            <a:fillRef idx="1">
+              <a:schemeClr val="accent1"/>
+            </a:fillRef>
+            <a:effectRef idx="0">
+              <a:schemeClr val="accent1"/>
+            </a:effectRef>
+            <a:fontRef idx="minor">
+              <a:schemeClr val="lt1"/>
+            </a:fontRef>
+          </p:style>
+          <p:txBody>
+            <a:bodyPr rtlCol="0" anchor="ctr"/>
+            <a:lstStyle/>
+            <a:p>
+              <a:pPr algn="ctr"/>
+              <a:endParaRPr lang="ru-RU"/>
+            </a:p>
+          </p:txBody>
+        </p:sp>
+        <p:pic>
+          <p:nvPicPr>
+            <p:cNvPr id="2052" name="Picture 4" descr="http://edu.cbsystematics.com/images/news/7a2f448a-e991-431c-9730-39616a426a83.png"/>
+            <p:cNvPicPr>
+              <a:picLocks noChangeAspect="1" noChangeArrowheads="1"/>
+            </p:cNvPicPr>
+            <p:nvPr/>
+          </p:nvPicPr>
+          <p:blipFill>
+            <a:blip r:embed="rId2">
+              <a:extLst>
+                <a:ext uri="{28A0092B-C50C-407E-A947-70E740481C1C}">
+                  <a14:useLocalDpi xmlns:a14="http://schemas.microsoft.com/office/drawing/2010/main" val="0"/>
+                </a:ext>
+              </a:extLst>
+            </a:blip>
+            <a:srcRect/>
+            <a:stretch>
+              <a:fillRect/>
+            </a:stretch>
+          </p:blipFill>
+          <p:spPr bwMode="auto">
+            <a:xfrm>
+              <a:off x="288530" y="1556792"/>
+              <a:ext cx="1416123" cy="546916"/>
+            </a:xfrm>
+            <a:prstGeom prst="rect">
+              <a:avLst/>
+            </a:prstGeom>
+            <a:noFill/>
+            <a:extLst>
+              <a:ext uri="{909E8E84-426E-40DD-AFC4-6F175D3DCCD1}">
+                <a14:hiddenFill xmlns:a14="http://schemas.microsoft.com/office/drawing/2010/main">
+                  <a:solidFill>
+                    <a:srgbClr val="FFFFFF"/>
+                  </a:solidFill>
+                </a14:hiddenFill>
+              </a:ext>
+            </a:extLst>
+          </p:spPr>
+        </p:pic>
+      </p:grpSp>
+      <p:pic>
+        <p:nvPicPr>
+          <p:cNvPr id="2053" name="Picture 5"/>
+          <p:cNvPicPr>
+            <a:picLocks noChangeAspect="1" noChangeArrowheads="1"/>
+          </p:cNvPicPr>
+          <p:nvPr/>
+        </p:nvPicPr>
+        <p:blipFill>
+          <a:blip r:embed="rId3">
+            <a:extLst>
+              <a:ext uri="{28A0092B-C50C-407E-A947-70E740481C1C}">
+                <a14:useLocalDpi xmlns:a14="http://schemas.microsoft.com/office/drawing/2010/main" val="0"/>
+              </a:ext>
+            </a:extLst>
+          </a:blip>
+          <a:srcRect/>
+          <a:stretch>
+            <a:fillRect/>
+          </a:stretch>
+        </p:blipFill>
+        <p:spPr bwMode="auto">
+          <a:xfrm>
+            <a:off x="3203848" y="620688"/>
+            <a:ext cx="457200" cy="457200"/>
+          </a:xfrm>
+          <a:prstGeom prst="rect">
+            <a:avLst/>
+          </a:prstGeom>
+          <a:noFill/>
+          <a:ln>
+            <a:noFill/>
+          </a:ln>
+          <a:effectLst/>
+          <a:extLst>
+            <a:ext uri="{909E8E84-426E-40DD-AFC4-6F175D3DCCD1}">
+              <a14:hiddenFill xmlns:a14="http://schemas.microsoft.com/office/drawing/2010/main">
+                <a:solidFill>
+                  <a:schemeClr val="accent1"/>
+                </a:solidFill>
+              </a14:hiddenFill>
+            </a:ext>
+            <a:ext uri="{91240B29-F687-4F45-9708-019B960494DF}">
+              <a14:hiddenLine xmlns:a14="http://schemas.microsoft.com/office/drawing/2010/main" w="9525">
+                <a:solidFill>
+                  <a:schemeClr val="tx1"/>
+                </a:solidFill>
+                <a:miter lim="800000"/>
+                <a:headEnd/>
+                <a:tailEnd/>
+              </a14:hiddenLine>
+            </a:ext>
+            <a:ext uri="{AF507438-7753-43E0-B8FC-AC1667EBCBE1}">
+              <a14:hiddenEffects xmlns:a14="http://schemas.microsoft.com/office/drawing/2010/main">
+                <a:effectLst>
+                  <a:outerShdw dist="35921" dir="2700000" algn="ctr" rotWithShape="0">
+                    <a:schemeClr val="bg2"/>
+                  </a:outerShdw>
+                </a:effectLst>
+              </a14:hiddenEffects>
+            </a:ext>
+          </a:extLst>
+        </p:spPr>
+      </p:pic>
+      <p:grpSp>
+        <p:nvGrpSpPr>
+          <p:cNvPr id="16" name="Группа 15"/>
+          <p:cNvGrpSpPr/>
+          <p:nvPr/>
+        </p:nvGrpSpPr>
+        <p:grpSpPr>
+          <a:xfrm>
+            <a:off x="2987823" y="4522783"/>
+            <a:ext cx="1584176" cy="1941934"/>
+            <a:chOff x="179512" y="2495178"/>
+            <a:chExt cx="1584176" cy="1941934"/>
+          </a:xfrm>
+        </p:grpSpPr>
+        <p:sp>
+          <p:nvSpPr>
+            <p:cNvPr id="22" name="Прямоугольник 21"/>
+            <p:cNvSpPr/>
+            <p:nvPr/>
+          </p:nvSpPr>
+          <p:spPr>
+            <a:xfrm>
+              <a:off x="179512" y="2495178"/>
+              <a:ext cx="1584176" cy="1941934"/>
+            </a:xfrm>
+            <a:prstGeom prst="rect">
+              <a:avLst/>
+            </a:prstGeom>
+            <a:solidFill>
+              <a:schemeClr val="bg1"/>
+            </a:solidFill>
+            <a:ln>
+              <a:solidFill>
+                <a:schemeClr val="tx1">
+                  <a:alpha val="40000"/>
+                </a:schemeClr>
+              </a:solidFill>
+            </a:ln>
+          </p:spPr>
+          <p:style>
+            <a:lnRef idx="2">
+              <a:schemeClr val="accent1">
+                <a:shade val="50000"/>
+              </a:schemeClr>
+            </a:lnRef>
+            <a:fillRef idx="1">
+              <a:schemeClr val="accent1"/>
+            </a:fillRef>
+            <a:effectRef idx="0">
+              <a:schemeClr val="accent1"/>
+            </a:effectRef>
+            <a:fontRef idx="minor">
+              <a:schemeClr val="lt1"/>
+            </a:fontRef>
+          </p:style>
+          <p:txBody>
+            <a:bodyPr rtlCol="0" anchor="ctr"/>
+            <a:lstStyle/>
+            <a:p>
+              <a:pPr algn="ctr"/>
+              <a:endParaRPr lang="ru-RU"/>
+            </a:p>
+          </p:txBody>
+        </p:sp>
+        <p:pic>
+          <p:nvPicPr>
+            <p:cNvPr id="2055" name="Picture 7" descr="http://i.zdnet.com/blogs/xamllogo.jpg"/>
+            <p:cNvPicPr>
+              <a:picLocks noChangeAspect="1" noChangeArrowheads="1"/>
+            </p:cNvPicPr>
+            <p:nvPr/>
+          </p:nvPicPr>
+          <p:blipFill>
+            <a:blip r:embed="rId4">
+              <a:extLst>
+                <a:ext uri="{28A0092B-C50C-407E-A947-70E740481C1C}">
+                  <a14:useLocalDpi xmlns:a14="http://schemas.microsoft.com/office/drawing/2010/main" val="0"/>
+                </a:ext>
+              </a:extLst>
+            </a:blip>
+            <a:srcRect/>
+            <a:stretch>
+              <a:fillRect/>
+            </a:stretch>
+          </p:blipFill>
+          <p:spPr bwMode="auto">
+            <a:xfrm>
+              <a:off x="288529" y="2596783"/>
+              <a:ext cx="1416124" cy="1768321"/>
+            </a:xfrm>
+            <a:prstGeom prst="rect">
+              <a:avLst/>
+            </a:prstGeom>
+            <a:noFill/>
+            <a:ln w="25400">
+              <a:noFill/>
+            </a:ln>
+          </p:spPr>
+        </p:pic>
+      </p:grpSp>
+      <p:grpSp>
+        <p:nvGrpSpPr>
+          <p:cNvPr id="18" name="Группа 17"/>
+          <p:cNvGrpSpPr/>
+          <p:nvPr/>
+        </p:nvGrpSpPr>
+        <p:grpSpPr>
+          <a:xfrm>
+            <a:off x="2987824" y="1412776"/>
+            <a:ext cx="5688631" cy="1008112"/>
+            <a:chOff x="1835696" y="1412776"/>
+            <a:chExt cx="5688631" cy="1008112"/>
+          </a:xfrm>
+        </p:grpSpPr>
+        <p:sp>
+          <p:nvSpPr>
+            <p:cNvPr id="23" name="Прямоугольник 22"/>
+            <p:cNvSpPr/>
+            <p:nvPr/>
+          </p:nvSpPr>
+          <p:spPr>
+            <a:xfrm>
+              <a:off x="1835696" y="1412776"/>
+              <a:ext cx="5688631" cy="1008112"/>
+            </a:xfrm>
+            <a:prstGeom prst="rect">
+              <a:avLst/>
+            </a:prstGeom>
+            <a:noFill/>
+            <a:ln>
+              <a:solidFill>
+                <a:schemeClr val="tx1">
+                  <a:alpha val="40000"/>
+                </a:schemeClr>
+              </a:solidFill>
+            </a:ln>
+          </p:spPr>
+          <p:style>
+            <a:lnRef idx="2">
+              <a:schemeClr val="accent1">
+                <a:shade val="50000"/>
+              </a:schemeClr>
+            </a:lnRef>
+            <a:fillRef idx="1">
+              <a:schemeClr val="accent1"/>
+            </a:fillRef>
+            <a:effectRef idx="0">
+              <a:schemeClr val="accent1"/>
+            </a:effectRef>
+            <a:fontRef idx="minor">
+              <a:schemeClr val="lt1"/>
+            </a:fontRef>
+          </p:style>
+          <p:txBody>
+            <a:bodyPr rtlCol="0" anchor="ctr"/>
+            <a:lstStyle/>
+            <a:p>
+              <a:pPr algn="ctr"/>
+              <a:endParaRPr lang="ru-RU"/>
+            </a:p>
+          </p:txBody>
+        </p:sp>
+        <p:pic>
+          <p:nvPicPr>
+            <p:cNvPr id="2057" name="Picture 9" descr="http://bloggingabout.net/cfs-filesystemfile.ashx/__key/CommunityServer.Blogs.Components.WeblogFiles/erwyn/NET-Logo.png"/>
+            <p:cNvPicPr>
+              <a:picLocks noChangeAspect="1" noChangeArrowheads="1"/>
+            </p:cNvPicPr>
+            <p:nvPr/>
+          </p:nvPicPr>
+          <p:blipFill>
+            <a:blip r:embed="rId5">
+              <a:extLst>
+                <a:ext uri="{28A0092B-C50C-407E-A947-70E740481C1C}">
+                  <a14:useLocalDpi xmlns:a14="http://schemas.microsoft.com/office/drawing/2010/main" val="0"/>
+                </a:ext>
+              </a:extLst>
+            </a:blip>
+            <a:srcRect/>
+            <a:stretch>
+              <a:fillRect/>
+            </a:stretch>
+          </p:blipFill>
+          <p:spPr bwMode="auto">
+            <a:xfrm>
+              <a:off x="2098948" y="1556792"/>
+              <a:ext cx="3124200" cy="771525"/>
+            </a:xfrm>
+            <a:prstGeom prst="rect">
+              <a:avLst/>
+            </a:prstGeom>
+            <a:noFill/>
+            <a:extLst>
+              <a:ext uri="{909E8E84-426E-40DD-AFC4-6F175D3DCCD1}">
+                <a14:hiddenFill xmlns:a14="http://schemas.microsoft.com/office/drawing/2010/main">
+                  <a:solidFill>
+                    <a:srgbClr val="FFFFFF"/>
+                  </a:solidFill>
+                </a14:hiddenFill>
+              </a:ext>
+            </a:extLst>
+          </p:spPr>
+        </p:pic>
+      </p:grpSp>
+      <p:grpSp>
+        <p:nvGrpSpPr>
+          <p:cNvPr id="17" name="Группа 16"/>
+          <p:cNvGrpSpPr/>
+          <p:nvPr/>
+        </p:nvGrpSpPr>
+        <p:grpSpPr>
+          <a:xfrm>
+            <a:off x="2987823" y="2495178"/>
+            <a:ext cx="5688631" cy="1941934"/>
+            <a:chOff x="1835696" y="2495178"/>
+            <a:chExt cx="5688631" cy="1941934"/>
+          </a:xfrm>
+        </p:grpSpPr>
+        <p:sp>
+          <p:nvSpPr>
+            <p:cNvPr id="24" name="Прямоугольник 23"/>
+            <p:cNvSpPr/>
+            <p:nvPr/>
+          </p:nvSpPr>
+          <p:spPr>
+            <a:xfrm>
+              <a:off x="1835696" y="2495178"/>
+              <a:ext cx="5688631" cy="1941934"/>
+            </a:xfrm>
+            <a:prstGeom prst="rect">
+              <a:avLst/>
+            </a:prstGeom>
+            <a:solidFill>
+              <a:schemeClr val="bg1"/>
+            </a:solidFill>
+            <a:ln>
+              <a:solidFill>
+                <a:schemeClr val="tx1">
+                  <a:alpha val="40000"/>
+                </a:schemeClr>
+              </a:solidFill>
+            </a:ln>
+          </p:spPr>
+          <p:style>
+            <a:lnRef idx="2">
+              <a:schemeClr val="accent1">
+                <a:shade val="50000"/>
+              </a:schemeClr>
+            </a:lnRef>
+            <a:fillRef idx="1">
+              <a:schemeClr val="accent1"/>
+            </a:fillRef>
+            <a:effectRef idx="0">
+              <a:schemeClr val="accent1"/>
+            </a:effectRef>
+            <a:fontRef idx="minor">
+              <a:schemeClr val="lt1"/>
+            </a:fontRef>
+          </p:style>
+          <p:txBody>
+            <a:bodyPr rtlCol="0" anchor="ctr"/>
+            <a:lstStyle/>
+            <a:p>
+              <a:pPr algn="ctr"/>
+              <a:endParaRPr lang="ru-RU"/>
+            </a:p>
+          </p:txBody>
+        </p:sp>
+        <p:pic>
+          <p:nvPicPr>
+            <p:cNvPr id="2059" name="Picture 11" descr="http://4.bp.blogspot.com/-SRwdfcuYhVo/UMjoTyAnxRI/AAAAAAAADpk/E6HaZxZrXic/s1600/Visual+Studio+Express+2012+Logo.png"/>
+            <p:cNvPicPr>
+              <a:picLocks noChangeAspect="1" noChangeArrowheads="1"/>
+            </p:cNvPicPr>
+            <p:nvPr/>
+          </p:nvPicPr>
+          <p:blipFill>
+            <a:blip r:embed="rId6">
+              <a:extLst>
+                <a:ext uri="{28A0092B-C50C-407E-A947-70E740481C1C}">
+                  <a14:useLocalDpi xmlns:a14="http://schemas.microsoft.com/office/drawing/2010/main" val="0"/>
+                </a:ext>
+              </a:extLst>
+            </a:blip>
+            <a:srcRect/>
+            <a:stretch>
+              <a:fillRect/>
+            </a:stretch>
+          </p:blipFill>
+          <p:spPr bwMode="auto">
+            <a:xfrm>
+              <a:off x="2411760" y="2596782"/>
+              <a:ext cx="5010150" cy="1504951"/>
+            </a:xfrm>
+            <a:prstGeom prst="rect">
+              <a:avLst/>
+            </a:prstGeom>
+            <a:noFill/>
+            <a:extLst>
+              <a:ext uri="{909E8E84-426E-40DD-AFC4-6F175D3DCCD1}">
+                <a14:hiddenFill xmlns:a14="http://schemas.microsoft.com/office/drawing/2010/main">
+                  <a:solidFill>
+                    <a:srgbClr val="FFFFFF"/>
+                  </a:solidFill>
+                </a14:hiddenFill>
+              </a:ext>
+            </a:extLst>
+          </p:spPr>
+        </p:pic>
+      </p:grpSp>
+      <p:pic>
+        <p:nvPicPr>
+          <p:cNvPr id="35" name="Picture 17" descr="http://www.bugtreat.com/blog/wp-content/uploads/2012/07/c-sharp-logo.png"/>
+          <p:cNvPicPr>
+            <a:picLocks noChangeAspect="1" noChangeArrowheads="1"/>
+          </p:cNvPicPr>
+          <p:nvPr/>
+        </p:nvPicPr>
+        <p:blipFill>
+          <a:blip r:embed="rId7">
+            <a:extLst>
+              <a:ext uri="{28A0092B-C50C-407E-A947-70E740481C1C}">
+                <a14:useLocalDpi xmlns:a14="http://schemas.microsoft.com/office/drawing/2010/main" val="0"/>
+              </a:ext>
+            </a:extLst>
+          </a:blip>
+          <a:srcRect/>
+          <a:stretch>
+            <a:fillRect/>
+          </a:stretch>
+        </p:blipFill>
+        <p:spPr bwMode="auto">
+          <a:xfrm>
+            <a:off x="467544" y="1425377"/>
+            <a:ext cx="2438400" cy="2438400"/>
+          </a:xfrm>
+          <a:prstGeom prst="rect">
+            <a:avLst/>
+          </a:prstGeom>
+          <a:noFill/>
+          <a:ln w="25400">
+            <a:solidFill>
+              <a:schemeClr val="tx1">
+                <a:alpha val="40000"/>
+              </a:schemeClr>
+            </a:solidFill>
+          </a:ln>
+          <a:extLst>
+            <a:ext uri="{909E8E84-426E-40DD-AFC4-6F175D3DCCD1}">
+              <a14:hiddenFill xmlns:a14="http://schemas.microsoft.com/office/drawing/2010/main">
+                <a:solidFill>
+                  <a:srgbClr val="FFFFFF"/>
+                </a:solidFill>
+              </a14:hiddenFill>
+            </a:ext>
+          </a:extLst>
+        </p:spPr>
+      </p:pic>
     </p:spTree>
     <p:extLst>
       <p:ext uri="{BB962C8B-B14F-4D97-AF65-F5344CB8AC3E}">
@@ -3823,6 +4358,549 @@
   <p:clrMapOvr>
     <a:masterClrMapping/>
   </p:clrMapOvr>
+  <p:transition spd="slow">
+    <p:push/>
+  </p:transition>
+  <p:timing>
+    <p:tnLst>
+      <p:par>
+        <p:cTn id="1" dur="indefinite" restart="never" nodeType="tmRoot"/>
+      </p:par>
+    </p:tnLst>
+  </p:timing>
+</p:sld>
+</file>
+
+<file path=ppt/slides/slide4.xml><?xml version="1.0" encoding="utf-8"?>
+<p:sld xmlns:a="http://schemas.openxmlformats.org/drawingml/2006/main" xmlns:r="http://schemas.openxmlformats.org/officeDocument/2006/relationships" xmlns:p="http://schemas.openxmlformats.org/presentationml/2006/main">
+  <p:cSld>
+    <p:spTree>
+      <p:nvGrpSpPr>
+        <p:cNvPr id="1" name=""/>
+        <p:cNvGrpSpPr/>
+        <p:nvPr/>
+      </p:nvGrpSpPr>
+      <p:grpSpPr>
+        <a:xfrm>
+          <a:off x="0" y="0"/>
+          <a:ext cx="0" cy="0"/>
+          <a:chOff x="0" y="0"/>
+          <a:chExt cx="0" cy="0"/>
+        </a:xfrm>
+      </p:grpSpPr>
+      <p:sp>
+        <p:nvSpPr>
+          <p:cNvPr id="32" name="Прямоугольник 31"/>
+          <p:cNvSpPr/>
+          <p:nvPr/>
+        </p:nvSpPr>
+        <p:spPr>
+          <a:xfrm>
+            <a:off x="488850" y="3332854"/>
+            <a:ext cx="5019254" cy="1824338"/>
+          </a:xfrm>
+          <a:prstGeom prst="rect">
+            <a:avLst/>
+          </a:prstGeom>
+          <a:solidFill>
+            <a:schemeClr val="bg1"/>
+          </a:solidFill>
+          <a:ln>
+            <a:solidFill>
+              <a:schemeClr val="tx1">
+                <a:alpha val="40000"/>
+              </a:schemeClr>
+            </a:solidFill>
+          </a:ln>
+        </p:spPr>
+        <p:style>
+          <a:lnRef idx="2">
+            <a:schemeClr val="accent1">
+              <a:shade val="50000"/>
+            </a:schemeClr>
+          </a:lnRef>
+          <a:fillRef idx="1">
+            <a:schemeClr val="accent1"/>
+          </a:fillRef>
+          <a:effectRef idx="0">
+            <a:schemeClr val="accent1"/>
+          </a:effectRef>
+          <a:fontRef idx="minor">
+            <a:schemeClr val="lt1"/>
+          </a:fontRef>
+        </p:style>
+        <p:txBody>
+          <a:bodyPr rtlCol="0" anchor="ctr"/>
+          <a:lstStyle/>
+          <a:p>
+            <a:pPr algn="ctr"/>
+            <a:endParaRPr lang="ru-RU"/>
+          </a:p>
+        </p:txBody>
+      </p:sp>
+      <p:sp>
+        <p:nvSpPr>
+          <p:cNvPr id="28" name="Прямоугольник 27"/>
+          <p:cNvSpPr/>
+          <p:nvPr/>
+        </p:nvSpPr>
+        <p:spPr>
+          <a:xfrm>
+            <a:off x="6491014" y="1989607"/>
+            <a:ext cx="1949202" cy="1224136"/>
+          </a:xfrm>
+          <a:prstGeom prst="rect">
+            <a:avLst/>
+          </a:prstGeom>
+          <a:solidFill>
+            <a:schemeClr val="bg1"/>
+          </a:solidFill>
+          <a:ln>
+            <a:solidFill>
+              <a:schemeClr val="tx1">
+                <a:alpha val="40000"/>
+              </a:schemeClr>
+            </a:solidFill>
+          </a:ln>
+        </p:spPr>
+        <p:style>
+          <a:lnRef idx="2">
+            <a:schemeClr val="accent1">
+              <a:shade val="50000"/>
+            </a:schemeClr>
+          </a:lnRef>
+          <a:fillRef idx="1">
+            <a:schemeClr val="accent1"/>
+          </a:fillRef>
+          <a:effectRef idx="0">
+            <a:schemeClr val="accent1"/>
+          </a:effectRef>
+          <a:fontRef idx="minor">
+            <a:schemeClr val="lt1"/>
+          </a:fontRef>
+        </p:style>
+        <p:txBody>
+          <a:bodyPr rtlCol="0" anchor="ctr"/>
+          <a:lstStyle/>
+          <a:p>
+            <a:pPr algn="ctr"/>
+            <a:endParaRPr lang="ru-RU"/>
+          </a:p>
+        </p:txBody>
+      </p:sp>
+      <p:sp>
+        <p:nvSpPr>
+          <p:cNvPr id="2" name="Заголовок 1"/>
+          <p:cNvSpPr>
+            <a:spLocks noGrp="1"/>
+          </p:cNvSpPr>
+          <p:nvPr>
+            <p:ph type="title"/>
+          </p:nvPr>
+        </p:nvSpPr>
+        <p:spPr/>
+        <p:txBody>
+          <a:bodyPr/>
+          <a:lstStyle/>
+          <a:p>
+            <a:r>
+              <a:rPr lang="en-US" dirty="0" smtClean="0"/>
+              <a:t>Tools</a:t>
+            </a:r>
+            <a:endParaRPr lang="ru-RU" dirty="0"/>
+          </a:p>
+        </p:txBody>
+      </p:sp>
+      <p:pic>
+        <p:nvPicPr>
+          <p:cNvPr id="6" name="Picture 5"/>
+          <p:cNvPicPr>
+            <a:picLocks noChangeAspect="1" noChangeArrowheads="1"/>
+          </p:cNvPicPr>
+          <p:nvPr/>
+        </p:nvPicPr>
+        <p:blipFill>
+          <a:blip r:embed="rId2">
+            <a:extLst>
+              <a:ext uri="{28A0092B-C50C-407E-A947-70E740481C1C}">
+                <a14:useLocalDpi xmlns:a14="http://schemas.microsoft.com/office/drawing/2010/main" val="0"/>
+              </a:ext>
+            </a:extLst>
+          </a:blip>
+          <a:srcRect/>
+          <a:stretch>
+            <a:fillRect/>
+          </a:stretch>
+        </p:blipFill>
+        <p:spPr bwMode="auto">
+          <a:xfrm>
+            <a:off x="3203848" y="620688"/>
+            <a:ext cx="457200" cy="457200"/>
+          </a:xfrm>
+          <a:prstGeom prst="rect">
+            <a:avLst/>
+          </a:prstGeom>
+          <a:noFill/>
+          <a:ln>
+            <a:noFill/>
+          </a:ln>
+          <a:effectLst/>
+          <a:extLst>
+            <a:ext uri="{909E8E84-426E-40DD-AFC4-6F175D3DCCD1}">
+              <a14:hiddenFill xmlns:a14="http://schemas.microsoft.com/office/drawing/2010/main">
+                <a:solidFill>
+                  <a:schemeClr val="accent1"/>
+                </a:solidFill>
+              </a14:hiddenFill>
+            </a:ext>
+            <a:ext uri="{91240B29-F687-4F45-9708-019B960494DF}">
+              <a14:hiddenLine xmlns:a14="http://schemas.microsoft.com/office/drawing/2010/main" w="9525">
+                <a:solidFill>
+                  <a:schemeClr val="tx1"/>
+                </a:solidFill>
+                <a:miter lim="800000"/>
+                <a:headEnd/>
+                <a:tailEnd/>
+              </a14:hiddenLine>
+            </a:ext>
+            <a:ext uri="{AF507438-7753-43E0-B8FC-AC1667EBCBE1}">
+              <a14:hiddenEffects xmlns:a14="http://schemas.microsoft.com/office/drawing/2010/main">
+                <a:effectLst>
+                  <a:outerShdw dist="35921" dir="2700000" algn="ctr" rotWithShape="0">
+                    <a:schemeClr val="bg2"/>
+                  </a:outerShdw>
+                </a:effectLst>
+              </a14:hiddenEffects>
+            </a:ext>
+          </a:extLst>
+        </p:spPr>
+      </p:pic>
+      <p:sp>
+        <p:nvSpPr>
+          <p:cNvPr id="17" name="Прямоугольник 16"/>
+          <p:cNvSpPr/>
+          <p:nvPr/>
+        </p:nvSpPr>
+        <p:spPr>
+          <a:xfrm>
+            <a:off x="488853" y="1484784"/>
+            <a:ext cx="3795115" cy="1728192"/>
+          </a:xfrm>
+          <a:prstGeom prst="rect">
+            <a:avLst/>
+          </a:prstGeom>
+          <a:solidFill>
+            <a:schemeClr val="bg1"/>
+          </a:solidFill>
+          <a:ln>
+            <a:solidFill>
+              <a:schemeClr val="tx1">
+                <a:alpha val="40000"/>
+              </a:schemeClr>
+            </a:solidFill>
+          </a:ln>
+        </p:spPr>
+        <p:style>
+          <a:lnRef idx="2">
+            <a:schemeClr val="accent1">
+              <a:shade val="50000"/>
+            </a:schemeClr>
+          </a:lnRef>
+          <a:fillRef idx="1">
+            <a:schemeClr val="accent1"/>
+          </a:fillRef>
+          <a:effectRef idx="0">
+            <a:schemeClr val="accent1"/>
+          </a:effectRef>
+          <a:fontRef idx="minor">
+            <a:schemeClr val="lt1"/>
+          </a:fontRef>
+        </p:style>
+        <p:txBody>
+          <a:bodyPr rtlCol="0" anchor="ctr"/>
+          <a:lstStyle/>
+          <a:p>
+            <a:pPr algn="ctr"/>
+            <a:endParaRPr lang="ru-RU"/>
+          </a:p>
+        </p:txBody>
+      </p:sp>
+      <p:pic>
+        <p:nvPicPr>
+          <p:cNvPr id="18" name="Picture 13" descr="http://git-scm.com/images/logos/downloads/Git-Logo-2Color.png"/>
+          <p:cNvPicPr>
+            <a:picLocks noChangeAspect="1" noChangeArrowheads="1"/>
+          </p:cNvPicPr>
+          <p:nvPr/>
+        </p:nvPicPr>
+        <p:blipFill>
+          <a:blip r:embed="rId3" cstate="print">
+            <a:extLst>
+              <a:ext uri="{28A0092B-C50C-407E-A947-70E740481C1C}">
+                <a14:useLocalDpi xmlns:a14="http://schemas.microsoft.com/office/drawing/2010/main" val="0"/>
+              </a:ext>
+            </a:extLst>
+          </a:blip>
+          <a:srcRect/>
+          <a:stretch>
+            <a:fillRect/>
+          </a:stretch>
+        </p:blipFill>
+        <p:spPr bwMode="auto">
+          <a:xfrm>
+            <a:off x="726719" y="1722140"/>
+            <a:ext cx="3171990" cy="1325741"/>
+          </a:xfrm>
+          <a:prstGeom prst="rect">
+            <a:avLst/>
+          </a:prstGeom>
+          <a:noFill/>
+          <a:extLst>
+            <a:ext uri="{909E8E84-426E-40DD-AFC4-6F175D3DCCD1}">
+              <a14:hiddenFill xmlns:a14="http://schemas.microsoft.com/office/drawing/2010/main">
+                <a:solidFill>
+                  <a:srgbClr val="FFFFFF"/>
+                </a:solidFill>
+              </a14:hiddenFill>
+            </a:ext>
+          </a:extLst>
+        </p:spPr>
+      </p:pic>
+      <p:sp>
+        <p:nvSpPr>
+          <p:cNvPr id="20" name="Прямоугольник 19"/>
+          <p:cNvSpPr/>
+          <p:nvPr/>
+        </p:nvSpPr>
+        <p:spPr>
+          <a:xfrm>
+            <a:off x="4411588" y="1989608"/>
+            <a:ext cx="1949202" cy="1224136"/>
+          </a:xfrm>
+          <a:prstGeom prst="rect">
+            <a:avLst/>
+          </a:prstGeom>
+          <a:solidFill>
+            <a:schemeClr val="bg1"/>
+          </a:solidFill>
+          <a:ln>
+            <a:solidFill>
+              <a:schemeClr val="tx1">
+                <a:alpha val="40000"/>
+              </a:schemeClr>
+            </a:solidFill>
+          </a:ln>
+        </p:spPr>
+        <p:style>
+          <a:lnRef idx="2">
+            <a:schemeClr val="accent1">
+              <a:shade val="50000"/>
+            </a:schemeClr>
+          </a:lnRef>
+          <a:fillRef idx="1">
+            <a:schemeClr val="accent1"/>
+          </a:fillRef>
+          <a:effectRef idx="0">
+            <a:schemeClr val="accent1"/>
+          </a:effectRef>
+          <a:fontRef idx="minor">
+            <a:schemeClr val="lt1"/>
+          </a:fontRef>
+        </p:style>
+        <p:txBody>
+          <a:bodyPr rtlCol="0" anchor="ctr"/>
+          <a:lstStyle/>
+          <a:p>
+            <a:pPr algn="ctr"/>
+            <a:endParaRPr lang="ru-RU"/>
+          </a:p>
+        </p:txBody>
+      </p:sp>
+      <p:pic>
+        <p:nvPicPr>
+          <p:cNvPr id="21" name="Picture 15" descr="NLog - Advanced .NET Logging"/>
+          <p:cNvPicPr>
+            <a:picLocks noChangeAspect="1" noChangeArrowheads="1"/>
+          </p:cNvPicPr>
+          <p:nvPr/>
+        </p:nvPicPr>
+        <p:blipFill rotWithShape="1">
+          <a:blip r:embed="rId4">
+            <a:extLst>
+              <a:ext uri="{28A0092B-C50C-407E-A947-70E740481C1C}">
+                <a14:useLocalDpi xmlns:a14="http://schemas.microsoft.com/office/drawing/2010/main" val="0"/>
+              </a:ext>
+            </a:extLst>
+          </a:blip>
+          <a:srcRect l="2161" r="53815"/>
+          <a:stretch/>
+        </p:blipFill>
+        <p:spPr bwMode="auto">
+          <a:xfrm>
+            <a:off x="4648189" y="2230200"/>
+            <a:ext cx="1476000" cy="742951"/>
+          </a:xfrm>
+          <a:prstGeom prst="rect">
+            <a:avLst/>
+          </a:prstGeom>
+          <a:noFill/>
+          <a:extLst>
+            <a:ext uri="{909E8E84-426E-40DD-AFC4-6F175D3DCCD1}">
+              <a14:hiddenFill xmlns:a14="http://schemas.microsoft.com/office/drawing/2010/main">
+                <a:solidFill>
+                  <a:srgbClr val="FFFFFF"/>
+                </a:solidFill>
+              </a14:hiddenFill>
+            </a:ext>
+          </a:extLst>
+        </p:spPr>
+      </p:pic>
+      <p:pic>
+        <p:nvPicPr>
+          <p:cNvPr id="3074" name="Picture 2" descr="SmartGit/Hg"/>
+          <p:cNvPicPr>
+            <a:picLocks noChangeAspect="1" noChangeArrowheads="1"/>
+          </p:cNvPicPr>
+          <p:nvPr/>
+        </p:nvPicPr>
+        <p:blipFill>
+          <a:blip r:embed="rId5">
+            <a:extLst>
+              <a:ext uri="{28A0092B-C50C-407E-A947-70E740481C1C}">
+                <a14:useLocalDpi xmlns:a14="http://schemas.microsoft.com/office/drawing/2010/main" val="0"/>
+              </a:ext>
+            </a:extLst>
+          </a:blip>
+          <a:srcRect/>
+          <a:stretch>
+            <a:fillRect/>
+          </a:stretch>
+        </p:blipFill>
+        <p:spPr bwMode="auto">
+          <a:xfrm>
+            <a:off x="6865540" y="2096850"/>
+            <a:ext cx="1200150" cy="1009650"/>
+          </a:xfrm>
+          <a:prstGeom prst="rect">
+            <a:avLst/>
+          </a:prstGeom>
+          <a:noFill/>
+          <a:ln w="25400">
+            <a:noFill/>
+          </a:ln>
+          <a:extLst>
+            <a:ext uri="{909E8E84-426E-40DD-AFC4-6F175D3DCCD1}">
+              <a14:hiddenFill xmlns:a14="http://schemas.microsoft.com/office/drawing/2010/main">
+                <a:solidFill>
+                  <a:srgbClr val="FFFFFF"/>
+                </a:solidFill>
+              </a14:hiddenFill>
+            </a:ext>
+          </a:extLst>
+        </p:spPr>
+      </p:pic>
+      <p:pic>
+        <p:nvPicPr>
+          <p:cNvPr id="3075" name="Picture 3" descr="C:\Users\hinst\Desktop\Octocat.png"/>
+          <p:cNvPicPr>
+            <a:picLocks noChangeAspect="1" noChangeArrowheads="1"/>
+          </p:cNvPicPr>
+          <p:nvPr/>
+        </p:nvPicPr>
+        <p:blipFill>
+          <a:blip r:embed="rId6" cstate="print">
+            <a:extLst>
+              <a:ext uri="{28A0092B-C50C-407E-A947-70E740481C1C}">
+                <a14:useLocalDpi xmlns:a14="http://schemas.microsoft.com/office/drawing/2010/main" val="0"/>
+              </a:ext>
+            </a:extLst>
+          </a:blip>
+          <a:srcRect/>
+          <a:stretch>
+            <a:fillRect/>
+          </a:stretch>
+        </p:blipFill>
+        <p:spPr bwMode="auto">
+          <a:xfrm>
+            <a:off x="700736" y="3598251"/>
+            <a:ext cx="1588017" cy="1319729"/>
+          </a:xfrm>
+          <a:prstGeom prst="rect">
+            <a:avLst/>
+          </a:prstGeom>
+          <a:noFill/>
+          <a:extLst>
+            <a:ext uri="{909E8E84-426E-40DD-AFC4-6F175D3DCCD1}">
+              <a14:hiddenFill xmlns:a14="http://schemas.microsoft.com/office/drawing/2010/main">
+                <a:solidFill>
+                  <a:srgbClr val="FFFFFF"/>
+                </a:solidFill>
+              </a14:hiddenFill>
+            </a:ext>
+          </a:extLst>
+        </p:spPr>
+      </p:pic>
+      <p:pic>
+        <p:nvPicPr>
+          <p:cNvPr id="3078" name="Picture 6" descr="https://a248.e.akamai.net/assets.github.com/images/modules/logos_page/GitHub-Logo.png?1361400667"/>
+          <p:cNvPicPr>
+            <a:picLocks noChangeAspect="1" noChangeArrowheads="1"/>
+          </p:cNvPicPr>
+          <p:nvPr/>
+        </p:nvPicPr>
+        <p:blipFill>
+          <a:blip r:embed="rId7" cstate="print">
+            <a:extLst>
+              <a:ext uri="{28A0092B-C50C-407E-A947-70E740481C1C}">
+                <a14:useLocalDpi xmlns:a14="http://schemas.microsoft.com/office/drawing/2010/main" val="0"/>
+              </a:ext>
+            </a:extLst>
+          </a:blip>
+          <a:srcRect/>
+          <a:stretch>
+            <a:fillRect/>
+          </a:stretch>
+        </p:blipFill>
+        <p:spPr bwMode="auto">
+          <a:xfrm>
+            <a:off x="2312714" y="3598251"/>
+            <a:ext cx="2830885" cy="1274494"/>
+          </a:xfrm>
+          <a:prstGeom prst="rect">
+            <a:avLst/>
+          </a:prstGeom>
+          <a:noFill/>
+          <a:extLst>
+            <a:ext uri="{909E8E84-426E-40DD-AFC4-6F175D3DCCD1}">
+              <a14:hiddenFill xmlns:a14="http://schemas.microsoft.com/office/drawing/2010/main">
+                <a:solidFill>
+                  <a:srgbClr val="FFFFFF"/>
+                </a:solidFill>
+              </a14:hiddenFill>
+            </a:ext>
+          </a:extLst>
+        </p:spPr>
+      </p:pic>
+    </p:spTree>
+    <p:extLst>
+      <p:ext uri="{BB962C8B-B14F-4D97-AF65-F5344CB8AC3E}">
+        <p14:creationId xmlns:p14="http://schemas.microsoft.com/office/powerpoint/2010/main" val="1772554684"/>
+      </p:ext>
+    </p:extLst>
+  </p:cSld>
+  <p:clrMapOvr>
+    <a:masterClrMapping/>
+  </p:clrMapOvr>
+  <p:transition spd="slow">
+    <p:push/>
+  </p:transition>
+  <p:timing>
+    <p:tnLst>
+      <p:par>
+        <p:cTn id="1" dur="indefinite" restart="never" nodeType="tmRoot"/>
+      </p:par>
+    </p:tnLst>
+  </p:timing>
 </p:sld>
 </file>
 

</xml_diff>

<commit_message>
ContentSerializer: debug output removed Documentation: reached release candidate state
</commit_message>
<xml_diff>
--- a/Documentation/coursetion.pptx
+++ b/Documentation/coursetion.pptx
@@ -15,6 +15,7 @@
     <p:sldId id="264" r:id="rId9"/>
     <p:sldId id="263" r:id="rId10"/>
     <p:sldId id="265" r:id="rId11"/>
+    <p:sldId id="266" r:id="rId12"/>
   </p:sldIdLst>
   <p:sldSz cx="9144000" cy="6858000" type="screen4x3"/>
   <p:notesSz cx="6858000" cy="9144000"/>
@@ -128,6 +129,7 @@
             <p14:sldId id="264"/>
             <p14:sldId id="263"/>
             <p14:sldId id="265"/>
+            <p14:sldId id="266"/>
           </p14:sldIdLst>
         </p14:section>
       </p14:sectionLst>
@@ -3966,7 +3968,7 @@
         <p:spPr>
           <a:xfrm>
             <a:off x="0" y="4479975"/>
-            <a:ext cx="8244408" cy="2062103"/>
+            <a:ext cx="8244408" cy="1323439"/>
           </a:xfrm>
           <a:prstGeom prst="rect">
             <a:avLst/>
@@ -4135,7 +4137,7 @@
           </a:p>
           <a:p>
             <a:r>
-              <a:rPr lang="en-US" sz="1600" dirty="0" smtClean="0">
+              <a:rPr lang="en-GB" sz="1600" dirty="0" smtClean="0">
                 <a:solidFill>
                   <a:srgbClr val="000000"/>
                 </a:solidFill>
@@ -4144,10 +4146,10 @@
                 </a:highlight>
                 <a:latin typeface="Consolas"/>
               </a:rPr>
-              <a:t>	</a:t>
-            </a:r>
-            <a:r>
-              <a:rPr lang="ru-RU" sz="1600" dirty="0" smtClean="0">
+              <a:t>		</a:t>
+            </a:r>
+            <a:r>
+              <a:rPr lang="en-GB" sz="1600" dirty="0" err="1" smtClean="0">
                 <a:solidFill>
                   <a:srgbClr val="000000"/>
                 </a:solidFill>
@@ -4156,19 +4158,8 @@
                 </a:highlight>
                 <a:latin typeface="Consolas"/>
               </a:rPr>
-              <a:t>{</a:t>
-            </a:r>
-            <a:endParaRPr lang="ru-RU" sz="1600" dirty="0">
-              <a:solidFill>
-                <a:srgbClr val="000000"/>
-              </a:solidFill>
-              <a:highlight>
-                <a:srgbClr val="FFFFFF"/>
-              </a:highlight>
-              <a:latin typeface="Consolas"/>
-            </a:endParaRPr>
-          </a:p>
-          <a:p>
+              <a:t>element.SetValue</a:t>
+            </a:r>
             <a:r>
               <a:rPr lang="en-GB" sz="1600" dirty="0" smtClean="0">
                 <a:solidFill>
@@ -4179,7 +4170,7 @@
                 </a:highlight>
                 <a:latin typeface="Consolas"/>
               </a:rPr>
-              <a:t>		</a:t>
+              <a:t>(</a:t>
             </a:r>
             <a:r>
               <a:rPr lang="en-GB" sz="1600" dirty="0" err="1" smtClean="0">
@@ -4191,7 +4182,43 @@
                 </a:highlight>
                 <a:latin typeface="Consolas"/>
               </a:rPr>
-              <a:t>element.SetValue</a:t>
+              <a:t>IdProperty</a:t>
+            </a:r>
+            <a:r>
+              <a:rPr lang="en-GB" sz="1600" dirty="0">
+                <a:solidFill>
+                  <a:srgbClr val="000000"/>
+                </a:solidFill>
+                <a:highlight>
+                  <a:srgbClr val="FFFFFF"/>
+                </a:highlight>
+                <a:latin typeface="Consolas"/>
+              </a:rPr>
+              <a:t>, </a:t>
+            </a:r>
+            <a:r>
+              <a:rPr lang="en-GB" sz="1600" dirty="0" err="1">
+                <a:solidFill>
+                  <a:srgbClr val="000000"/>
+                </a:solidFill>
+                <a:highlight>
+                  <a:srgbClr val="FFFFFF"/>
+                </a:highlight>
+                <a:latin typeface="Consolas"/>
+              </a:rPr>
+              <a:t>GetNewId</a:t>
+            </a:r>
+            <a:r>
+              <a:rPr lang="en-GB" sz="1600" dirty="0">
+                <a:solidFill>
+                  <a:srgbClr val="000000"/>
+                </a:solidFill>
+                <a:highlight>
+                  <a:srgbClr val="FFFFFF"/>
+                </a:highlight>
+                <a:latin typeface="Consolas"/>
+              </a:rPr>
+              <a:t>(element</a:t>
             </a:r>
             <a:r>
               <a:rPr lang="en-GB" sz="1600" dirty="0" smtClean="0">
@@ -4203,169 +4230,9 @@
                 </a:highlight>
                 <a:latin typeface="Consolas"/>
               </a:rPr>
-              <a:t>(</a:t>
-            </a:r>
-            <a:r>
-              <a:rPr lang="en-GB" sz="1600" dirty="0" err="1" smtClean="0">
-                <a:solidFill>
-                  <a:srgbClr val="000000"/>
-                </a:solidFill>
-                <a:highlight>
-                  <a:srgbClr val="FFFFFF"/>
-                </a:highlight>
-                <a:latin typeface="Consolas"/>
-              </a:rPr>
-              <a:t>IdProperty</a:t>
-            </a:r>
-            <a:r>
-              <a:rPr lang="en-GB" sz="1600" dirty="0">
-                <a:solidFill>
-                  <a:srgbClr val="000000"/>
-                </a:solidFill>
-                <a:highlight>
-                  <a:srgbClr val="FFFFFF"/>
-                </a:highlight>
-                <a:latin typeface="Consolas"/>
-              </a:rPr>
-              <a:t>, </a:t>
-            </a:r>
-            <a:r>
-              <a:rPr lang="en-GB" sz="1600" dirty="0" err="1">
-                <a:solidFill>
-                  <a:srgbClr val="000000"/>
-                </a:solidFill>
-                <a:highlight>
-                  <a:srgbClr val="FFFFFF"/>
-                </a:highlight>
-                <a:latin typeface="Consolas"/>
-              </a:rPr>
-              <a:t>GetNewId</a:t>
-            </a:r>
-            <a:r>
-              <a:rPr lang="en-GB" sz="1600" dirty="0">
-                <a:solidFill>
-                  <a:srgbClr val="000000"/>
-                </a:solidFill>
-                <a:highlight>
-                  <a:srgbClr val="FFFFFF"/>
-                </a:highlight>
-                <a:latin typeface="Consolas"/>
-              </a:rPr>
-              <a:t>(element));</a:t>
-            </a:r>
-          </a:p>
-          <a:p>
-            <a:r>
-              <a:rPr lang="en-GB" sz="1600" dirty="0" smtClean="0">
-                <a:solidFill>
-                  <a:srgbClr val="2B91AF"/>
-                </a:solidFill>
-                <a:highlight>
-                  <a:srgbClr val="FFFFFF"/>
-                </a:highlight>
-                <a:latin typeface="Consolas"/>
-              </a:rPr>
-              <a:t>		</a:t>
-            </a:r>
-            <a:r>
-              <a:rPr lang="en-GB" sz="1600" dirty="0" err="1" smtClean="0">
-                <a:solidFill>
-                  <a:srgbClr val="2B91AF"/>
-                </a:solidFill>
-                <a:highlight>
-                  <a:srgbClr val="FFFFFF"/>
-                </a:highlight>
-                <a:latin typeface="Consolas"/>
-              </a:rPr>
-              <a:t>Console</a:t>
-            </a:r>
-            <a:r>
-              <a:rPr lang="en-GB" sz="1600" dirty="0" err="1" smtClean="0">
-                <a:solidFill>
-                  <a:srgbClr val="000000"/>
-                </a:solidFill>
-                <a:highlight>
-                  <a:srgbClr val="FFFFFF"/>
-                </a:highlight>
-                <a:latin typeface="Consolas"/>
-              </a:rPr>
-              <a:t>.WriteLine</a:t>
-            </a:r>
-            <a:r>
-              <a:rPr lang="en-GB" sz="1600" dirty="0" smtClean="0">
-                <a:solidFill>
-                  <a:srgbClr val="000000"/>
-                </a:solidFill>
-                <a:highlight>
-                  <a:srgbClr val="FFFFFF"/>
-                </a:highlight>
-                <a:latin typeface="Consolas"/>
-              </a:rPr>
-              <a:t>(</a:t>
-            </a:r>
-            <a:r>
-              <a:rPr lang="en-GB" sz="1600" dirty="0" err="1" smtClean="0">
-                <a:solidFill>
-                  <a:srgbClr val="000000"/>
-                </a:solidFill>
-                <a:highlight>
-                  <a:srgbClr val="FFFFFF"/>
-                </a:highlight>
-                <a:latin typeface="Consolas"/>
-              </a:rPr>
-              <a:t>GetExistingId</a:t>
-            </a:r>
-            <a:r>
-              <a:rPr lang="en-GB" sz="1600" dirty="0" smtClean="0">
-                <a:solidFill>
-                  <a:srgbClr val="000000"/>
-                </a:solidFill>
-                <a:highlight>
-                  <a:srgbClr val="FFFFFF"/>
-                </a:highlight>
-                <a:latin typeface="Consolas"/>
-              </a:rPr>
-              <a:t>(element</a:t>
-            </a:r>
-            <a:r>
-              <a:rPr lang="en-GB" sz="1600" dirty="0">
-                <a:solidFill>
-                  <a:srgbClr val="000000"/>
-                </a:solidFill>
-                <a:highlight>
-                  <a:srgbClr val="FFFFFF"/>
-                </a:highlight>
-                <a:latin typeface="Consolas"/>
-              </a:rPr>
-              <a:t>));</a:t>
-            </a:r>
-          </a:p>
-          <a:p>
-            <a:r>
-              <a:rPr lang="en-US" sz="1600" dirty="0" smtClean="0">
-                <a:solidFill>
-                  <a:srgbClr val="000000"/>
-                </a:solidFill>
-                <a:highlight>
-                  <a:srgbClr val="FFFFFF"/>
-                </a:highlight>
-                <a:latin typeface="Consolas"/>
-              </a:rPr>
-              <a:t>	</a:t>
-            </a:r>
-            <a:r>
-              <a:rPr lang="ru-RU" sz="1600" dirty="0" smtClean="0">
-                <a:solidFill>
-                  <a:srgbClr val="000000"/>
-                </a:solidFill>
-                <a:highlight>
-                  <a:srgbClr val="FFFFFF"/>
-                </a:highlight>
-                <a:latin typeface="Consolas"/>
-              </a:rPr>
-              <a:t>}</a:t>
-            </a:r>
-            <a:endParaRPr lang="ru-RU" sz="1600" dirty="0">
+              <a:t>))</a:t>
+            </a:r>
+            <a:endParaRPr lang="en-GB" sz="1600" dirty="0">
               <a:solidFill>
                 <a:srgbClr val="000000"/>
               </a:solidFill>
@@ -4410,6 +4277,177 @@
   <p:clrMapOvr>
     <a:masterClrMapping/>
   </p:clrMapOvr>
+  <p:transition spd="slow">
+    <p:push/>
+  </p:transition>
+  <p:timing>
+    <p:tnLst>
+      <p:par>
+        <p:cTn id="1" dur="indefinite" restart="never" nodeType="tmRoot"/>
+      </p:par>
+    </p:tnLst>
+  </p:timing>
+</p:sld>
+</file>
+
+<file path=ppt/slides/slide11.xml><?xml version="1.0" encoding="utf-8"?>
+<p:sld xmlns:a="http://schemas.openxmlformats.org/drawingml/2006/main" xmlns:r="http://schemas.openxmlformats.org/officeDocument/2006/relationships" xmlns:p="http://schemas.openxmlformats.org/presentationml/2006/main">
+  <p:cSld>
+    <p:spTree>
+      <p:nvGrpSpPr>
+        <p:cNvPr id="1" name=""/>
+        <p:cNvGrpSpPr/>
+        <p:nvPr/>
+      </p:nvGrpSpPr>
+      <p:grpSpPr>
+        <a:xfrm>
+          <a:off x="0" y="0"/>
+          <a:ext cx="0" cy="0"/>
+          <a:chOff x="0" y="0"/>
+          <a:chExt cx="0" cy="0"/>
+        </a:xfrm>
+      </p:grpSpPr>
+      <p:sp>
+        <p:nvSpPr>
+          <p:cNvPr id="2" name="Заголовок 1"/>
+          <p:cNvSpPr>
+            <a:spLocks noGrp="1"/>
+          </p:cNvSpPr>
+          <p:nvPr>
+            <p:ph type="title"/>
+          </p:nvPr>
+        </p:nvSpPr>
+        <p:spPr/>
+        <p:txBody>
+          <a:bodyPr/>
+          <a:lstStyle/>
+          <a:p>
+            <a:r>
+              <a:rPr lang="en-US" dirty="0" smtClean="0"/>
+              <a:t>End of presentation</a:t>
+            </a:r>
+            <a:endParaRPr lang="ru-RU" dirty="0"/>
+          </a:p>
+        </p:txBody>
+      </p:sp>
+      <p:pic>
+        <p:nvPicPr>
+          <p:cNvPr id="11266" name="Picture 2"/>
+          <p:cNvPicPr>
+            <a:picLocks noChangeAspect="1" noChangeArrowheads="1"/>
+          </p:cNvPicPr>
+          <p:nvPr/>
+        </p:nvPicPr>
+        <p:blipFill>
+          <a:blip r:embed="rId2">
+            <a:extLst>
+              <a:ext uri="{28A0092B-C50C-407E-A947-70E740481C1C}">
+                <a14:useLocalDpi xmlns:a14="http://schemas.microsoft.com/office/drawing/2010/main" val="0"/>
+              </a:ext>
+            </a:extLst>
+          </a:blip>
+          <a:srcRect/>
+          <a:stretch>
+            <a:fillRect/>
+          </a:stretch>
+        </p:blipFill>
+        <p:spPr bwMode="auto">
+          <a:xfrm>
+            <a:off x="8604448" y="6282526"/>
+            <a:ext cx="457200" cy="457200"/>
+          </a:xfrm>
+          <a:prstGeom prst="rect">
+            <a:avLst/>
+          </a:prstGeom>
+          <a:noFill/>
+          <a:ln>
+            <a:noFill/>
+          </a:ln>
+          <a:effectLst/>
+          <a:extLst>
+            <a:ext uri="{909E8E84-426E-40DD-AFC4-6F175D3DCCD1}">
+              <a14:hiddenFill xmlns:a14="http://schemas.microsoft.com/office/drawing/2010/main">
+                <a:solidFill>
+                  <a:schemeClr val="accent1"/>
+                </a:solidFill>
+              </a14:hiddenFill>
+            </a:ext>
+            <a:ext uri="{91240B29-F687-4F45-9708-019B960494DF}">
+              <a14:hiddenLine xmlns:a14="http://schemas.microsoft.com/office/drawing/2010/main" w="9525">
+                <a:solidFill>
+                  <a:schemeClr val="tx1"/>
+                </a:solidFill>
+                <a:miter lim="800000"/>
+                <a:headEnd/>
+                <a:tailEnd/>
+              </a14:hiddenLine>
+            </a:ext>
+            <a:ext uri="{AF507438-7753-43E0-B8FC-AC1667EBCBE1}">
+              <a14:hiddenEffects xmlns:a14="http://schemas.microsoft.com/office/drawing/2010/main">
+                <a:effectLst>
+                  <a:outerShdw dist="35921" dir="2700000" algn="ctr" rotWithShape="0">
+                    <a:schemeClr val="bg2"/>
+                  </a:outerShdw>
+                </a:effectLst>
+              </a14:hiddenEffects>
+            </a:ext>
+          </a:extLst>
+        </p:spPr>
+      </p:pic>
+      <p:pic>
+        <p:nvPicPr>
+          <p:cNvPr id="11268" name="Picture 4" descr="C:\Users\hinst\Docs\Pro\Coursework_2\Documentation\ScreenShots\ScreenHunter_24 Feb. 26 01.25.png"/>
+          <p:cNvPicPr>
+            <a:picLocks noChangeAspect="1" noChangeArrowheads="1"/>
+          </p:cNvPicPr>
+          <p:nvPr/>
+        </p:nvPicPr>
+        <p:blipFill>
+          <a:blip r:embed="rId3">
+            <a:extLst>
+              <a:ext uri="{28A0092B-C50C-407E-A947-70E740481C1C}">
+                <a14:useLocalDpi xmlns:a14="http://schemas.microsoft.com/office/drawing/2010/main" val="0"/>
+              </a:ext>
+            </a:extLst>
+          </a:blip>
+          <a:srcRect/>
+          <a:stretch>
+            <a:fillRect/>
+          </a:stretch>
+        </p:blipFill>
+        <p:spPr bwMode="auto">
+          <a:xfrm>
+            <a:off x="1279029" y="1268760"/>
+            <a:ext cx="6480720" cy="5242366"/>
+          </a:xfrm>
+          <a:prstGeom prst="rect">
+            <a:avLst/>
+          </a:prstGeom>
+          <a:noFill/>
+          <a:extLst>
+            <a:ext uri="{909E8E84-426E-40DD-AFC4-6F175D3DCCD1}">
+              <a14:hiddenFill xmlns:a14="http://schemas.microsoft.com/office/drawing/2010/main">
+                <a:solidFill>
+                  <a:srgbClr val="FFFFFF"/>
+                </a:solidFill>
+              </a14:hiddenFill>
+            </a:ext>
+          </a:extLst>
+        </p:spPr>
+      </p:pic>
+    </p:spTree>
+    <p:extLst>
+      <p:ext uri="{BB962C8B-B14F-4D97-AF65-F5344CB8AC3E}">
+        <p14:creationId xmlns:p14="http://schemas.microsoft.com/office/powerpoint/2010/main" val="1224253156"/>
+      </p:ext>
+    </p:extLst>
+  </p:cSld>
+  <p:clrMapOvr>
+    <a:masterClrMapping/>
+  </p:clrMapOvr>
+  <p:transition spd="slow">
+    <p:push/>
+  </p:transition>
   <p:timing>
     <p:tnLst>
       <p:par>
@@ -6222,6 +6260,9 @@
   <p:clrMapOvr>
     <a:masterClrMapping/>
   </p:clrMapOvr>
+  <p:transition spd="slow">
+    <p:push/>
+  </p:transition>
   <p:timing>
     <p:tnLst>
       <p:par>
@@ -9039,6 +9080,9 @@
   <p:clrMapOvr>
     <a:masterClrMapping/>
   </p:clrMapOvr>
+  <p:transition spd="slow">
+    <p:push/>
+  </p:transition>
   <p:timing>
     <p:tnLst>
       <p:par>
@@ -11569,6 +11613,9 @@
   <p:clrMapOvr>
     <a:masterClrMapping/>
   </p:clrMapOvr>
+  <p:transition spd="slow">
+    <p:push/>
+  </p:transition>
   <p:timing>
     <p:tnLst>
       <p:par>
@@ -11793,6 +11840,9 @@
   <p:clrMapOvr>
     <a:masterClrMapping/>
   </p:clrMapOvr>
+  <p:transition spd="slow">
+    <p:push/>
+  </p:transition>
   <p:timing>
     <p:tnLst>
       <p:par>
@@ -12857,6 +12907,9 @@
   <p:clrMapOvr>
     <a:masterClrMapping/>
   </p:clrMapOvr>
+  <p:transition spd="slow">
+    <p:push/>
+  </p:transition>
   <p:timing>
     <p:tnLst>
       <p:par>

</xml_diff>